<commit_message>
added front page gif
</commit_message>
<xml_diff>
--- a/HAPPY-JUMPER_Final.pptx
+++ b/HAPPY-JUMPER_Final.pptx
@@ -20,8 +20,7 @@
     <p:sldId id="270" r:id="rId14"/>
     <p:sldId id="271" r:id="rId15"/>
     <p:sldId id="272" r:id="rId16"/>
-    <p:sldId id="274" r:id="rId17"/>
-    <p:sldId id="273" r:id="rId18"/>
+    <p:sldId id="273" r:id="rId17"/>
   </p:sldIdLst>
   <p:sldSz cx="12192000" cy="6858000"/>
   <p:notesSz cx="6858000" cy="9144000"/>
@@ -128,6 +127,27 @@
 </p:presentation>
 </file>
 
+<file path=ppt/changesInfos/changesInfo1.xml><?xml version="1.0" encoding="utf-8"?>
+<pc:chgInfo xmlns:a="http://purl.oclc.org/ooxml/drawingml/main" xmlns:r="http://purl.oclc.org/ooxml/officeDocument/relationships" xmlns:ac="http://schemas.microsoft.com/office/drawing/2013/main/command" xmlns:pc="http://schemas.microsoft.com/office/powerpoint/2013/main/command">
+  <pc:docChgLst>
+    <pc:chgData name="nikos kolovos" userId="30d79144d7f11ebf" providerId="LiveId" clId="{E65767AE-265B-451B-B629-3666BA730F02}"/>
+    <pc:docChg chg="delSld">
+      <pc:chgData name="nikos kolovos" userId="30d79144d7f11ebf" providerId="LiveId" clId="{E65767AE-265B-451B-B629-3666BA730F02}" dt="2024-12-03T13:22:36.779" v="0" actId="47"/>
+      <pc:docMkLst>
+        <pc:docMk/>
+      </pc:docMkLst>
+      <pc:sldChg chg="del">
+        <pc:chgData name="nikos kolovos" userId="30d79144d7f11ebf" providerId="LiveId" clId="{E65767AE-265B-451B-B629-3666BA730F02}" dt="2024-12-03T13:22:36.779" v="0" actId="47"/>
+        <pc:sldMkLst>
+          <pc:docMk/>
+          <pc:sldMk cId="604518125" sldId="274"/>
+        </pc:sldMkLst>
+      </pc:sldChg>
+    </pc:docChg>
+  </pc:docChgLst>
+</pc:chgInfo>
+</file>
+
 <file path=ppt/slideLayouts/slideLayout1.xml><?xml version="1.0" encoding="utf-8"?>
 <p:sldLayout xmlns:a="http://purl.oclc.org/ooxml/drawingml/main" xmlns:r="http://purl.oclc.org/ooxml/officeDocument/relationships" xmlns:p="http://purl.oclc.org/ooxml/presentationml/main" type="title" preserve="1">
   <p:cSld name="Title Slide">
@@ -301,7 +321,7 @@
             <a:fld id="{C9E2D185-F69F-4D5A-B44B-B85FDDD47FBD}" type="datetime1">
               <a:rPr lang="en-US"/>
               <a:pPr lvl="0"/>
-              <a:t>5/21/2020</a:t>
+              <a:t>12/3/2024</a:t>
             </a:fld>
             <a:endParaRPr lang="en-US" dirty="0"/>
           </a:p>
@@ -603,7 +623,7 @@
             <a:fld id="{28A2AC9D-5845-486A-AD31-1D19BD6857DA}" type="datetime1">
               <a:rPr lang="en-US"/>
               <a:pPr lvl="0"/>
-              <a:t>5/21/2020</a:t>
+              <a:t>12/3/2024</a:t>
             </a:fld>
             <a:endParaRPr lang="en-US" dirty="0"/>
           </a:p>
@@ -842,7 +862,7 @@
             <a:fld id="{87E0C2DD-3DE1-478B-93A1-CF2329162AC8}" type="datetime1">
               <a:rPr lang="en-US"/>
               <a:pPr lvl="0"/>
-              <a:t>5/21/2020</a:t>
+              <a:t>12/3/2024</a:t>
             </a:fld>
             <a:endParaRPr lang="en-US" dirty="0"/>
           </a:p>
@@ -1246,7 +1266,7 @@
             <a:fld id="{BFFFC569-46B0-4EEF-BF5B-48D6D4C1078B}" type="datetime1">
               <a:rPr lang="en-US"/>
               <a:pPr lvl="0"/>
-              <a:t>5/21/2020</a:t>
+              <a:t>12/3/2024</a:t>
             </a:fld>
             <a:endParaRPr lang="en-US" dirty="0"/>
           </a:p>
@@ -1485,7 +1505,7 @@
             <a:fld id="{464423D7-DF0F-48A3-B00A-31C7970A3099}" type="datetime1">
               <a:rPr lang="en-US"/>
               <a:pPr lvl="0"/>
-              <a:t>5/21/2020</a:t>
+              <a:t>12/3/2024</a:t>
             </a:fld>
             <a:endParaRPr lang="en-US" dirty="0"/>
           </a:p>
@@ -1889,7 +1909,7 @@
             <a:fld id="{278D16F7-C816-45B9-823D-85C93D6FC1C9}" type="datetime1">
               <a:rPr lang="en-US"/>
               <a:pPr lvl="0"/>
-              <a:t>5/21/2020</a:t>
+              <a:t>12/3/2024</a:t>
             </a:fld>
             <a:endParaRPr lang="en-US" dirty="0"/>
           </a:p>
@@ -2167,7 +2187,7 @@
             <a:fld id="{9CB97151-5793-488A-8DA8-C45ECE06FBCD}" type="datetime1">
               <a:rPr lang="en-US"/>
               <a:pPr lvl="0"/>
-              <a:t>5/21/2020</a:t>
+              <a:t>12/3/2024</a:t>
             </a:fld>
             <a:endParaRPr lang="en-US" dirty="0"/>
           </a:p>
@@ -2402,7 +2422,7 @@
             <a:fld id="{5103A9FF-8854-4A72-9630-2DFE4AB1587D}" type="datetime1">
               <a:rPr lang="en-US"/>
               <a:pPr lvl="0"/>
-              <a:t>5/21/2020</a:t>
+              <a:t>12/3/2024</a:t>
             </a:fld>
             <a:endParaRPr lang="en-US" dirty="0"/>
           </a:p>
@@ -2713,7 +2733,7 @@
             <a:fld id="{98E4CBDB-B2A1-465F-A503-7D9F26E929E6}" type="datetime1">
               <a:rPr lang="en-US"/>
               <a:pPr lvl="0"/>
-              <a:t>5/21/2020</a:t>
+              <a:t>12/3/2024</a:t>
             </a:fld>
             <a:endParaRPr lang="en-US" dirty="0"/>
           </a:p>
@@ -2981,7 +3001,7 @@
             <a:fld id="{D28956FF-797A-44C9-BF61-87C34AD4A29F}" type="datetime1">
               <a:rPr lang="en-US"/>
               <a:pPr lvl="0"/>
-              <a:t>5/21/2020</a:t>
+              <a:t>12/3/2024</a:t>
             </a:fld>
             <a:endParaRPr lang="en-US" dirty="0"/>
           </a:p>
@@ -3221,7 +3241,7 @@
             <a:fld id="{DCB437E5-C5E8-412A-A6C7-B4AD038344B2}" type="datetime1">
               <a:rPr lang="en-US"/>
               <a:pPr lvl="0"/>
-              <a:t>5/21/2020</a:t>
+              <a:t>12/3/2024</a:t>
             </a:fld>
             <a:endParaRPr lang="en-US" dirty="0"/>
           </a:p>
@@ -3572,7 +3592,7 @@
             <a:fld id="{BA5F0A66-1604-411B-B3CB-8945CC3628AB}" type="datetime1">
               <a:rPr lang="en-US"/>
               <a:pPr lvl="0"/>
-              <a:t>5/21/2020</a:t>
+              <a:t>12/3/2024</a:t>
             </a:fld>
             <a:endParaRPr lang="en-US" dirty="0"/>
           </a:p>
@@ -3971,7 +3991,7 @@
             <a:fld id="{2397B827-00C5-4B00-B7FB-647E20F738A8}" type="datetime1">
               <a:rPr lang="en-US"/>
               <a:pPr lvl="0"/>
-              <a:t>5/21/2020</a:t>
+              <a:t>12/3/2024</a:t>
             </a:fld>
             <a:endParaRPr lang="en-US" dirty="0"/>
           </a:p>
@@ -4166,7 +4186,7 @@
             <a:fld id="{6EE871B3-55B4-4763-A2A6-5F073FFC2A6D}" type="datetime1">
               <a:rPr lang="en-US"/>
               <a:pPr lvl="0"/>
-              <a:t>5/21/2020</a:t>
+              <a:t>12/3/2024</a:t>
             </a:fld>
             <a:endParaRPr lang="en-US" dirty="0"/>
           </a:p>
@@ -4328,7 +4348,7 @@
             <a:fld id="{9A470A86-C7BF-4AAB-950D-8CC3C597F7F3}" type="datetime1">
               <a:rPr lang="en-US"/>
               <a:pPr lvl="0"/>
-              <a:t>5/21/2020</a:t>
+              <a:t>12/3/2024</a:t>
             </a:fld>
             <a:endParaRPr lang="en-US" dirty="0"/>
           </a:p>
@@ -4645,7 +4665,7 @@
             <a:fld id="{46033C3B-4ABA-499F-A1B9-D8A5E1FD64A2}" type="datetime1">
               <a:rPr lang="en-US"/>
               <a:pPr lvl="0"/>
-              <a:t>5/21/2020</a:t>
+              <a:t>12/3/2024</a:t>
             </a:fld>
             <a:endParaRPr lang="en-US" dirty="0"/>
           </a:p>
@@ -4936,7 +4956,7 @@
             <a:fld id="{78165B00-6E04-437C-9DD8-9305B4A75057}" type="datetime1">
               <a:rPr lang="en-US"/>
               <a:pPr lvl="0"/>
-              <a:t>5/21/2020</a:t>
+              <a:t>12/3/2024</a:t>
             </a:fld>
             <a:endParaRPr lang="en-US" dirty="0"/>
           </a:p>
@@ -5220,7 +5240,7 @@
             <a:fld id="{320A8EAB-3FF4-49A7-B12B-709686F0BA83}" type="datetime1">
               <a:rPr lang="en-US"/>
               <a:pPr lvl="0"/>
-              <a:t>5/21/2020</a:t>
+              <a:t>12/3/2024</a:t>
             </a:fld>
             <a:endParaRPr lang="en-US" dirty="0"/>
           </a:p>
@@ -8454,516 +8474,6 @@
       </p:grpSpPr>
       <p:sp>
         <p:nvSpPr>
-          <p:cNvPr id="44" name="Rectangle 34">
-            <a:extLst>
-              <a:ext uri="{FF2B5EF4-FFF2-40B4-BE49-F238E27FC236}">
-                <a16:creationId xmlns:a16="http://schemas.microsoft.com/office/drawing/2014/main" id="{936CFC0A-8C37-453C-9488-1B30FBC3B3B0}"/>
-              </a:ext>
-              <a:ext uri="{C183D7F6-B498-43B3-948B-1728B52AA6E4}">
-                <adec:decorative xmlns:adec="http://schemas.microsoft.com/office/drawing/2017/decorative" val="1"/>
-              </a:ext>
-            </a:extLst>
-          </p:cNvPr>
-          <p:cNvSpPr>
-            <a:spLocks noGrp="1" noRot="1" noChangeAspect="1" noMove="1" noResize="1" noEditPoints="1" noAdjustHandles="1" noChangeArrowheads="1" noChangeShapeType="1" noTextEdit="1"/>
-          </p:cNvSpPr>
-          <p:nvPr>
-            <p:extLst>
-              <p:ext uri="{386F3935-93C4-4BCD-93E2-E3B085C9AB24}">
-                <p16:designElem xmlns:p16="http://schemas.microsoft.com/office/powerpoint/2015/main" val="1"/>
-              </p:ext>
-            </p:extLst>
-          </p:nvPr>
-        </p:nvSpPr>
-        <p:spPr>
-          <a:xfrm>
-            <a:off x="0" y="0"/>
-            <a:ext cx="12192000" cy="6858000"/>
-          </a:xfrm>
-          <a:prstGeom prst="rect">
-            <a:avLst/>
-          </a:prstGeom>
-          <a:solidFill>
-            <a:srgbClr val="FFFFFF"/>
-          </a:solidFill>
-          <a:ln w="12700" cap="flat" cmpd="sng" algn="ctr">
-            <a:noFill/>
-            <a:prstDash val="solid"/>
-            <a:miter lim="800%"/>
-          </a:ln>
-          <a:effectLst/>
-        </p:spPr>
-        <p:style>
-          <a:lnRef idx="2">
-            <a:schemeClr val="accent1">
-              <a:shade val="50%"/>
-            </a:schemeClr>
-          </a:lnRef>
-          <a:fillRef idx="1">
-            <a:schemeClr val="accent1"/>
-          </a:fillRef>
-          <a:effectRef idx="0">
-            <a:schemeClr val="accent1"/>
-          </a:effectRef>
-          <a:fontRef idx="minor">
-            <a:schemeClr val="lt1"/>
-          </a:fontRef>
-        </p:style>
-        <p:txBody>
-          <a:bodyPr rtlCol="0" anchor="ctr"/>
-          <a:lstStyle/>
-          <a:p>
-            <a:pPr algn="ctr"/>
-            <a:endParaRPr lang="en-US"/>
-          </a:p>
-        </p:txBody>
-      </p:sp>
-      <p:sp>
-        <p:nvSpPr>
-          <p:cNvPr id="2" name="Title 1">
-            <a:extLst>
-              <a:ext uri="{FF2B5EF4-FFF2-40B4-BE49-F238E27FC236}">
-                <a16:creationId xmlns:a16="http://schemas.microsoft.com/office/drawing/2014/main" id="{01216581-05EE-4B0E-89AD-866F3B55E08A}"/>
-              </a:ext>
-            </a:extLst>
-          </p:cNvPr>
-          <p:cNvSpPr txBox="1">
-            <a:spLocks noGrp="1"/>
-          </p:cNvSpPr>
-          <p:nvPr>
-            <p:ph type="title"/>
-          </p:nvPr>
-        </p:nvSpPr>
-        <p:spPr>
-          <a:xfrm>
-            <a:off x="1382597" y="3424348"/>
-            <a:ext cx="9426806" cy="1424410"/>
-          </a:xfrm>
-        </p:spPr>
-        <p:txBody>
-          <a:bodyPr vert="horz" lIns="91440" tIns="45720" rIns="91440" bIns="45720" rtlCol="0" anchor="b">
-            <a:normAutofit/>
-          </a:bodyPr>
-          <a:lstStyle/>
-          <a:p>
-            <a:pPr lvl="0" algn="ctr" defTabSz="914400">
-              <a:lnSpc>
-                <a:spcPct val="90%"/>
-              </a:lnSpc>
-              <a:spcBef>
-                <a:spcPct val="0%"/>
-              </a:spcBef>
-            </a:pPr>
-            <a:r>
-              <a:rPr lang="en-US" sz="5400" b="1" dirty="0">
-                <a:solidFill>
-                  <a:srgbClr val="1B1B1B"/>
-                </a:solidFill>
-                <a:latin typeface="+mj-lt"/>
-                <a:ea typeface="+mj-ea"/>
-                <a:cs typeface="+mj-cs"/>
-              </a:rPr>
-              <a:t>DEMO!</a:t>
-            </a:r>
-          </a:p>
-        </p:txBody>
-      </p:sp>
-      <p:sp>
-        <p:nvSpPr>
-          <p:cNvPr id="45" name="Oval 36">
-            <a:extLst>
-              <a:ext uri="{FF2B5EF4-FFF2-40B4-BE49-F238E27FC236}">
-                <a16:creationId xmlns:a16="http://schemas.microsoft.com/office/drawing/2014/main" id="{FBC3EAFD-A275-4F9B-8F62-72B6678F35A8}"/>
-              </a:ext>
-              <a:ext uri="{C183D7F6-B498-43B3-948B-1728B52AA6E4}">
-                <adec:decorative xmlns:adec="http://schemas.microsoft.com/office/drawing/2017/decorative" val="1"/>
-              </a:ext>
-            </a:extLst>
-          </p:cNvPr>
-          <p:cNvSpPr>
-            <a:spLocks noGrp="1" noRot="1" noChangeAspect="1" noMove="1" noResize="1" noEditPoints="1" noAdjustHandles="1" noChangeArrowheads="1" noChangeShapeType="1" noTextEdit="1"/>
-          </p:cNvSpPr>
-          <p:nvPr>
-            <p:extLst>
-              <p:ext uri="{386F3935-93C4-4BCD-93E2-E3B085C9AB24}">
-                <p16:designElem xmlns:p16="http://schemas.microsoft.com/office/powerpoint/2015/main" val="1"/>
-              </p:ext>
-            </p:extLst>
-          </p:nvPr>
-        </p:nvSpPr>
-        <p:spPr>
-          <a:xfrm>
-            <a:off x="4908526" y="933319"/>
-            <a:ext cx="2463430" cy="2486070"/>
-          </a:xfrm>
-          <a:prstGeom prst="ellipse">
-            <a:avLst/>
-          </a:prstGeom>
-          <a:solidFill>
-            <a:srgbClr val="445B5F"/>
-          </a:solidFill>
-          <a:ln>
-            <a:noFill/>
-          </a:ln>
-        </p:spPr>
-        <p:style>
-          <a:lnRef idx="2">
-            <a:schemeClr val="accent1">
-              <a:shade val="50%"/>
-            </a:schemeClr>
-          </a:lnRef>
-          <a:fillRef idx="1">
-            <a:schemeClr val="accent1"/>
-          </a:fillRef>
-          <a:effectRef idx="0">
-            <a:schemeClr val="accent1"/>
-          </a:effectRef>
-          <a:fontRef idx="minor">
-            <a:schemeClr val="lt1"/>
-          </a:fontRef>
-        </p:style>
-        <p:txBody>
-          <a:bodyPr rtlCol="0" anchor="ctr"/>
-          <a:lstStyle/>
-          <a:p>
-            <a:pPr algn="ctr"/>
-            <a:endParaRPr lang="en-US"/>
-          </a:p>
-        </p:txBody>
-      </p:sp>
-      <p:sp>
-        <p:nvSpPr>
-          <p:cNvPr id="46" name="Oval 38">
-            <a:extLst>
-              <a:ext uri="{FF2B5EF4-FFF2-40B4-BE49-F238E27FC236}">
-                <a16:creationId xmlns:a16="http://schemas.microsoft.com/office/drawing/2014/main" id="{06E64A6D-2B9F-4AAD-AB42-A61BAF01AC12}"/>
-              </a:ext>
-              <a:ext uri="{C183D7F6-B498-43B3-948B-1728B52AA6E4}">
-                <adec:decorative xmlns:adec="http://schemas.microsoft.com/office/drawing/2017/decorative" val="1"/>
-              </a:ext>
-            </a:extLst>
-          </p:cNvPr>
-          <p:cNvSpPr>
-            <a:spLocks noGrp="1" noRot="1" noChangeAspect="1" noMove="1" noResize="1" noEditPoints="1" noAdjustHandles="1" noChangeArrowheads="1" noChangeShapeType="1" noTextEdit="1"/>
-          </p:cNvSpPr>
-          <p:nvPr>
-            <p:extLst>
-              <p:ext uri="{386F3935-93C4-4BCD-93E2-E3B085C9AB24}">
-                <p16:designElem xmlns:p16="http://schemas.microsoft.com/office/powerpoint/2015/main" val="1"/>
-              </p:ext>
-            </p:extLst>
-          </p:nvPr>
-        </p:nvSpPr>
-        <p:spPr>
-          <a:xfrm>
-            <a:off x="5117592" y="1268361"/>
-            <a:ext cx="1956816" cy="1953058"/>
-          </a:xfrm>
-          <a:prstGeom prst="ellipse">
-            <a:avLst/>
-          </a:prstGeom>
-          <a:solidFill>
-            <a:srgbClr val="FFFFFF"/>
-          </a:solidFill>
-          <a:ln>
-            <a:solidFill>
-              <a:srgbClr val="445B5F"/>
-            </a:solidFill>
-          </a:ln>
-        </p:spPr>
-        <p:style>
-          <a:lnRef idx="2">
-            <a:schemeClr val="accent1">
-              <a:shade val="50%"/>
-            </a:schemeClr>
-          </a:lnRef>
-          <a:fillRef idx="1">
-            <a:schemeClr val="accent1"/>
-          </a:fillRef>
-          <a:effectRef idx="0">
-            <a:schemeClr val="accent1"/>
-          </a:effectRef>
-          <a:fontRef idx="minor">
-            <a:schemeClr val="lt1"/>
-          </a:fontRef>
-        </p:style>
-        <p:txBody>
-          <a:bodyPr rtlCol="0" anchor="ctr"/>
-          <a:lstStyle/>
-          <a:p>
-            <a:pPr algn="ctr"/>
-            <a:endParaRPr lang="en-US"/>
-          </a:p>
-        </p:txBody>
-      </p:sp>
-      <p:pic>
-        <p:nvPicPr>
-          <p:cNvPr id="5" name="Picture 4" descr="A close up of a toy&#10;&#10;Description automatically generated">
-            <a:extLst>
-              <a:ext uri="{FF2B5EF4-FFF2-40B4-BE49-F238E27FC236}">
-                <a16:creationId xmlns:a16="http://schemas.microsoft.com/office/drawing/2014/main" id="{F355D7A4-ADC9-4C81-8171-54FBE454C1BC}"/>
-              </a:ext>
-            </a:extLst>
-          </p:cNvPr>
-          <p:cNvPicPr>
-            <a:picLocks noChangeAspect="1"/>
-          </p:cNvPicPr>
-          <p:nvPr/>
-        </p:nvPicPr>
-        <p:blipFill rotWithShape="1">
-          <a:blip r:embed="rId2">
-            <a:alphaModFix/>
-            <a:extLst>
-              <a:ext uri="{28A0092B-C50C-407E-A947-70E740481C1C}">
-                <a14:useLocalDpi xmlns:a14="http://schemas.microsoft.com/office/drawing/2010/main" val="0"/>
-              </a:ext>
-            </a:extLst>
-          </a:blip>
-          <a:srcRect r="-0.003%" b="12.997%"/>
-          <a:stretch/>
-        </p:blipFill>
-        <p:spPr>
-          <a:xfrm>
-            <a:off x="5181600" y="1330490"/>
-            <a:ext cx="1828800" cy="1828800"/>
-          </a:xfrm>
-          <a:custGeom>
-            <a:avLst/>
-            <a:gdLst/>
-            <a:ahLst/>
-            <a:cxnLst/>
-            <a:rect l="l" t="t" r="r" b="b"/>
-            <a:pathLst>
-              <a:path w="6057610" h="6057610">
-                <a:moveTo>
-                  <a:pt x="3028805" y="0"/>
-                </a:moveTo>
-                <a:cubicBezTo>
-                  <a:pt x="4701568" y="0"/>
-                  <a:pt x="6057610" y="1356042"/>
-                  <a:pt x="6057610" y="3028805"/>
-                </a:cubicBezTo>
-                <a:cubicBezTo>
-                  <a:pt x="6057610" y="4701568"/>
-                  <a:pt x="4701568" y="6057610"/>
-                  <a:pt x="3028805" y="6057610"/>
-                </a:cubicBezTo>
-                <a:cubicBezTo>
-                  <a:pt x="1356042" y="6057610"/>
-                  <a:pt x="0" y="4701568"/>
-                  <a:pt x="0" y="3028805"/>
-                </a:cubicBezTo>
-                <a:cubicBezTo>
-                  <a:pt x="0" y="1356042"/>
-                  <a:pt x="1356042" y="0"/>
-                  <a:pt x="3028805" y="0"/>
-                </a:cubicBezTo>
-                <a:close/>
-              </a:path>
-            </a:pathLst>
-          </a:custGeom>
-          <a:effectLst>
-            <a:softEdge rad="0"/>
-          </a:effectLst>
-        </p:spPr>
-      </p:pic>
-      <p:pic>
-        <p:nvPicPr>
-          <p:cNvPr id="47" name="Picture 40">
-            <a:extLst>
-              <a:ext uri="{FF2B5EF4-FFF2-40B4-BE49-F238E27FC236}">
-                <a16:creationId xmlns:a16="http://schemas.microsoft.com/office/drawing/2014/main" id="{C51881DD-AD85-41BE-8A49-C2FB45800E10}"/>
-              </a:ext>
-              <a:ext uri="{C183D7F6-B498-43B3-948B-1728B52AA6E4}">
-                <adec:decorative xmlns:adec="http://schemas.microsoft.com/office/drawing/2017/decorative" val="1"/>
-              </a:ext>
-            </a:extLst>
-          </p:cNvPr>
-          <p:cNvPicPr>
-            <a:picLocks noGrp="1" noRot="1" noChangeAspect="1" noMove="1" noResize="1" noEditPoints="1" noAdjustHandles="1" noChangeArrowheads="1" noChangeShapeType="1" noCrop="1"/>
-          </p:cNvPicPr>
-          <p:nvPr>
-            <p:extLst>
-              <p:ext uri="{386F3935-93C4-4BCD-93E2-E3B085C9AB24}">
-                <p16:designElem xmlns:p16="http://schemas.microsoft.com/office/powerpoint/2015/main" val="1"/>
-              </p:ext>
-            </p:extLst>
-          </p:nvPr>
-        </p:nvPicPr>
-        <p:blipFill>
-          <a:blip r:embed="rId3" cstate="print">
-            <a:extLst>
-              <a:ext uri="{28A0092B-C50C-407E-A947-70E740481C1C}">
-                <a14:useLocalDpi xmlns:a14="http://schemas.microsoft.com/office/drawing/2010/main" val="0"/>
-              </a:ext>
-            </a:extLst>
-          </a:blip>
-          <a:srcRect l="33.525%" t="5.243%" r="33.525%" b="36.18%"/>
-          <a:stretch>
-            <a:fillRect/>
-          </a:stretch>
-        </p:blipFill>
-        <p:spPr>
-          <a:xfrm>
-            <a:off x="4860081" y="896194"/>
-            <a:ext cx="2560320" cy="2560320"/>
-          </a:xfrm>
-          <a:custGeom>
-            <a:avLst/>
-            <a:gdLst>
-              <a:gd name="connsiteX0" fmla="*/ 2008598 w 4017196"/>
-              <a:gd name="connsiteY0" fmla="*/ 0 h 4017196"/>
-              <a:gd name="connsiteX1" fmla="*/ 4017196 w 4017196"/>
-              <a:gd name="connsiteY1" fmla="*/ 2008598 h 4017196"/>
-              <a:gd name="connsiteX2" fmla="*/ 2008598 w 4017196"/>
-              <a:gd name="connsiteY2" fmla="*/ 4017196 h 4017196"/>
-              <a:gd name="connsiteX3" fmla="*/ 0 w 4017196"/>
-              <a:gd name="connsiteY3" fmla="*/ 2008598 h 4017196"/>
-              <a:gd name="connsiteX4" fmla="*/ 2008598 w 4017196"/>
-              <a:gd name="connsiteY4" fmla="*/ 0 h 4017196"/>
-            </a:gdLst>
-            <a:ahLst/>
-            <a:cxnLst>
-              <a:cxn ang="0">
-                <a:pos x="connsiteX0" y="connsiteY0"/>
-              </a:cxn>
-              <a:cxn ang="0">
-                <a:pos x="connsiteX1" y="connsiteY1"/>
-              </a:cxn>
-              <a:cxn ang="0">
-                <a:pos x="connsiteX2" y="connsiteY2"/>
-              </a:cxn>
-              <a:cxn ang="0">
-                <a:pos x="connsiteX3" y="connsiteY3"/>
-              </a:cxn>
-              <a:cxn ang="0">
-                <a:pos x="connsiteX4" y="connsiteY4"/>
-              </a:cxn>
-            </a:cxnLst>
-            <a:rect l="l" t="t" r="r" b="b"/>
-            <a:pathLst>
-              <a:path w="4017196" h="4017196">
-                <a:moveTo>
-                  <a:pt x="2008598" y="0"/>
-                </a:moveTo>
-                <a:cubicBezTo>
-                  <a:pt x="3117916" y="0"/>
-                  <a:pt x="4017196" y="899280"/>
-                  <a:pt x="4017196" y="2008598"/>
-                </a:cubicBezTo>
-                <a:cubicBezTo>
-                  <a:pt x="4017196" y="3117916"/>
-                  <a:pt x="3117916" y="4017196"/>
-                  <a:pt x="2008598" y="4017196"/>
-                </a:cubicBezTo>
-                <a:cubicBezTo>
-                  <a:pt x="899280" y="4017196"/>
-                  <a:pt x="0" y="3117916"/>
-                  <a:pt x="0" y="2008598"/>
-                </a:cubicBezTo>
-                <a:cubicBezTo>
-                  <a:pt x="0" y="899280"/>
-                  <a:pt x="899280" y="0"/>
-                  <a:pt x="2008598" y="0"/>
-                </a:cubicBezTo>
-                <a:close/>
-              </a:path>
-            </a:pathLst>
-          </a:custGeom>
-        </p:spPr>
-      </p:pic>
-      <p:cxnSp>
-        <p:nvCxnSpPr>
-          <p:cNvPr id="43" name="Straight Connector 42">
-            <a:extLst>
-              <a:ext uri="{FF2B5EF4-FFF2-40B4-BE49-F238E27FC236}">
-                <a16:creationId xmlns:a16="http://schemas.microsoft.com/office/drawing/2014/main" id="{9AD20FE8-ED02-4CDE-83B1-A1436305C3DC}"/>
-              </a:ext>
-              <a:ext uri="{C183D7F6-B498-43B3-948B-1728B52AA6E4}">
-                <adec:decorative xmlns:adec="http://schemas.microsoft.com/office/drawing/2017/decorative" val="1"/>
-              </a:ext>
-            </a:extLst>
-          </p:cNvPr>
-          <p:cNvCxnSpPr>
-            <a:cxnSpLocks noGrp="1" noRot="1" noChangeAspect="1" noMove="1" noResize="1" noEditPoints="1" noAdjustHandles="1" noChangeArrowheads="1" noChangeShapeType="1"/>
-          </p:cNvCxnSpPr>
-          <p:nvPr>
-            <p:extLst>
-              <p:ext uri="{386F3935-93C4-4BCD-93E2-E3B085C9AB24}">
-                <p16:designElem xmlns:p16="http://schemas.microsoft.com/office/powerpoint/2015/main" val="1"/>
-              </p:ext>
-            </p:extLst>
-          </p:nvPr>
-        </p:nvCxnSpPr>
-        <p:spPr>
-          <a:xfrm>
-            <a:off x="5775960" y="4971278"/>
-            <a:ext cx="640080" cy="0"/>
-          </a:xfrm>
-          <a:prstGeom prst="line">
-            <a:avLst/>
-          </a:prstGeom>
-          <a:ln w="28575">
-            <a:solidFill>
-              <a:srgbClr val="FEDA9C"/>
-            </a:solidFill>
-          </a:ln>
-        </p:spPr>
-        <p:style>
-          <a:lnRef idx="1">
-            <a:schemeClr val="accent1"/>
-          </a:lnRef>
-          <a:fillRef idx="0">
-            <a:schemeClr val="accent1"/>
-          </a:fillRef>
-          <a:effectRef idx="0">
-            <a:schemeClr val="accent1"/>
-          </a:effectRef>
-          <a:fontRef idx="minor">
-            <a:schemeClr val="tx1"/>
-          </a:fontRef>
-        </p:style>
-      </p:cxnSp>
-    </p:spTree>
-    <p:extLst>
-      <p:ext uri="{BB962C8B-B14F-4D97-AF65-F5344CB8AC3E}">
-        <p14:creationId xmlns:p14="http://schemas.microsoft.com/office/powerpoint/2010/main" val="604518125"/>
-      </p:ext>
-    </p:extLst>
-  </p:cSld>
-  <p:clrMapOvr>
-    <a:masterClrMapping/>
-  </p:clrMapOvr>
-</p:sld>
-</file>
-
-<file path=ppt/slides/slide17.xml><?xml version="1.0" encoding="utf-8"?>
-<p:sld xmlns:a="http://purl.oclc.org/ooxml/drawingml/main" xmlns:r="http://purl.oclc.org/ooxml/officeDocument/relationships" xmlns:p="http://purl.oclc.org/ooxml/presentationml/main">
-  <p:cSld>
-    <p:bg>
-      <p:bgPr>
-        <a:solidFill>
-          <a:schemeClr val="bg1"/>
-        </a:solidFill>
-        <a:effectLst/>
-      </p:bgPr>
-    </p:bg>
-    <p:spTree>
-      <p:nvGrpSpPr>
-        <p:cNvPr id="1" name=""/>
-        <p:cNvGrpSpPr/>
-        <p:nvPr/>
-      </p:nvGrpSpPr>
-      <p:grpSpPr>
-        <a:xfrm>
-          <a:off x="0" y="0"/>
-          <a:ext cx="0" cy="0"/>
-          <a:chOff x="0" y="0"/>
-          <a:chExt cx="0" cy="0"/>
-        </a:xfrm>
-      </p:grpSpPr>
-      <p:sp>
-        <p:nvSpPr>
           <p:cNvPr id="19" name="Rectangle 18">
             <a:extLst>
               <a:ext uri="{FF2B5EF4-FFF2-40B4-BE49-F238E27FC236}">

</xml_diff>